<commit_message>
Created second visualization 100% graph
</commit_message>
<xml_diff>
--- a/patina_visualizations.pptx
+++ b/patina_visualizations.pptx
@@ -5,10 +5,12 @@
     <p:sldMasterId id="2147483648" r:id="rId1"/>
   </p:sldMasterIdLst>
   <p:notesMasterIdLst>
-    <p:notesMasterId r:id="rId3"/>
+    <p:notesMasterId r:id="rId5"/>
   </p:notesMasterIdLst>
   <p:sldIdLst>
     <p:sldId id="256" r:id="rId2"/>
+    <p:sldId id="257" r:id="rId3"/>
+    <p:sldId id="258" r:id="rId4"/>
   </p:sldIdLst>
   <p:sldSz cx="12192000" cy="6858000"/>
   <p:notesSz cx="6858000" cy="9144000"/>
@@ -107,6 +109,11 @@
       </a:defRPr>
     </a:lvl9pPr>
   </p:defaultTextStyle>
+  <p:extLst>
+    <p:ext uri="{EFAFB233-063F-42B5-8137-9DF3F51BA10A}">
+      <p15:sldGuideLst xmlns:p15="http://schemas.microsoft.com/office/powerpoint/2012/main"/>
+    </p:ext>
+  </p:extLst>
 </p:presentation>
 </file>
 
@@ -192,7 +199,7 @@
           <a:p>
             <a:fld id="{DDBB2E29-D9FC-9A40-ABE6-712CD373131D}" type="datetimeFigureOut">
               <a:rPr lang="en-US" smtClean="0"/>
-              <a:t>7/18/24</a:t>
+              <a:t>7/19/24</a:t>
             </a:fld>
             <a:endParaRPr lang="en-US"/>
           </a:p>
@@ -529,6 +536,47 @@
             </a:r>
           </a:p>
           <a:p>
+            <a:pPr>
+              <a:buFont typeface="Arial" panose="020B0604020202020204" pitchFamily="34" charset="0"/>
+              <a:buChar char="•"/>
+            </a:pPr>
+            <a:r>
+              <a:rPr lang="en-US" dirty="0">
+                <a:effectLst/>
+                <a:latin typeface="Helvetica Neue" panose="02000503000000020004" pitchFamily="2" charset="0"/>
+              </a:rPr>
+              <a:t> </a:t>
+            </a:r>
+            <a:r>
+              <a:rPr lang="en-US" dirty="0">
+                <a:effectLst/>
+                <a:latin typeface="Helvetica Neue" panose="02000503000000020004" pitchFamily="2" charset="0"/>
+                <a:sym typeface="Wingdings" pitchFamily="2" charset="2"/>
+              </a:rPr>
+              <a:t> add what </a:t>
+            </a:r>
+            <a:r>
+              <a:rPr lang="en-US" dirty="0" err="1">
+                <a:effectLst/>
+                <a:latin typeface="Helvetica Neue" panose="02000503000000020004" pitchFamily="2" charset="0"/>
+                <a:sym typeface="Wingdings" pitchFamily="2" charset="2"/>
+              </a:rPr>
+              <a:t>countyids</a:t>
+            </a:r>
+            <a:r>
+              <a:rPr lang="en-US" dirty="0">
+                <a:effectLst/>
+                <a:latin typeface="Helvetica Neue" panose="02000503000000020004" pitchFamily="2" charset="0"/>
+                <a:sym typeface="Wingdings" pitchFamily="2" charset="2"/>
+              </a:rPr>
+              <a:t> are associated with which states</a:t>
+            </a:r>
+            <a:endParaRPr lang="en-US" dirty="0">
+              <a:effectLst/>
+              <a:latin typeface="Helvetica Neue" panose="02000503000000020004" pitchFamily="2" charset="0"/>
+            </a:endParaRPr>
+          </a:p>
+          <a:p>
             <a:endParaRPr lang="en-US" dirty="0"/>
           </a:p>
         </p:txBody>
@@ -716,7 +764,7 @@
           <a:p>
             <a:fld id="{803F9780-EB5E-084D-9DB8-7D85A386B454}" type="datetimeFigureOut">
               <a:rPr lang="en-US" smtClean="0"/>
-              <a:t>7/18/24</a:t>
+              <a:t>7/19/24</a:t>
             </a:fld>
             <a:endParaRPr lang="en-US"/>
           </a:p>
@@ -914,7 +962,7 @@
           <a:p>
             <a:fld id="{803F9780-EB5E-084D-9DB8-7D85A386B454}" type="datetimeFigureOut">
               <a:rPr lang="en-US" smtClean="0"/>
-              <a:t>7/18/24</a:t>
+              <a:t>7/19/24</a:t>
             </a:fld>
             <a:endParaRPr lang="en-US"/>
           </a:p>
@@ -1122,7 +1170,7 @@
           <a:p>
             <a:fld id="{803F9780-EB5E-084D-9DB8-7D85A386B454}" type="datetimeFigureOut">
               <a:rPr lang="en-US" smtClean="0"/>
-              <a:t>7/18/24</a:t>
+              <a:t>7/19/24</a:t>
             </a:fld>
             <a:endParaRPr lang="en-US"/>
           </a:p>
@@ -1320,7 +1368,7 @@
           <a:p>
             <a:fld id="{803F9780-EB5E-084D-9DB8-7D85A386B454}" type="datetimeFigureOut">
               <a:rPr lang="en-US" smtClean="0"/>
-              <a:t>7/18/24</a:t>
+              <a:t>7/19/24</a:t>
             </a:fld>
             <a:endParaRPr lang="en-US"/>
           </a:p>
@@ -1595,7 +1643,7 @@
           <a:p>
             <a:fld id="{803F9780-EB5E-084D-9DB8-7D85A386B454}" type="datetimeFigureOut">
               <a:rPr lang="en-US" smtClean="0"/>
-              <a:t>7/18/24</a:t>
+              <a:t>7/19/24</a:t>
             </a:fld>
             <a:endParaRPr lang="en-US"/>
           </a:p>
@@ -1860,7 +1908,7 @@
           <a:p>
             <a:fld id="{803F9780-EB5E-084D-9DB8-7D85A386B454}" type="datetimeFigureOut">
               <a:rPr lang="en-US" smtClean="0"/>
-              <a:t>7/18/24</a:t>
+              <a:t>7/19/24</a:t>
             </a:fld>
             <a:endParaRPr lang="en-US"/>
           </a:p>
@@ -2272,7 +2320,7 @@
           <a:p>
             <a:fld id="{803F9780-EB5E-084D-9DB8-7D85A386B454}" type="datetimeFigureOut">
               <a:rPr lang="en-US" smtClean="0"/>
-              <a:t>7/18/24</a:t>
+              <a:t>7/19/24</a:t>
             </a:fld>
             <a:endParaRPr lang="en-US"/>
           </a:p>
@@ -2413,7 +2461,7 @@
           <a:p>
             <a:fld id="{803F9780-EB5E-084D-9DB8-7D85A386B454}" type="datetimeFigureOut">
               <a:rPr lang="en-US" smtClean="0"/>
-              <a:t>7/18/24</a:t>
+              <a:t>7/19/24</a:t>
             </a:fld>
             <a:endParaRPr lang="en-US"/>
           </a:p>
@@ -2526,7 +2574,7 @@
           <a:p>
             <a:fld id="{803F9780-EB5E-084D-9DB8-7D85A386B454}" type="datetimeFigureOut">
               <a:rPr lang="en-US" smtClean="0"/>
-              <a:t>7/18/24</a:t>
+              <a:t>7/19/24</a:t>
             </a:fld>
             <a:endParaRPr lang="en-US"/>
           </a:p>
@@ -2837,7 +2885,7 @@
           <a:p>
             <a:fld id="{803F9780-EB5E-084D-9DB8-7D85A386B454}" type="datetimeFigureOut">
               <a:rPr lang="en-US" smtClean="0"/>
-              <a:t>7/18/24</a:t>
+              <a:t>7/19/24</a:t>
             </a:fld>
             <a:endParaRPr lang="en-US"/>
           </a:p>
@@ -3125,7 +3173,7 @@
           <a:p>
             <a:fld id="{803F9780-EB5E-084D-9DB8-7D85A386B454}" type="datetimeFigureOut">
               <a:rPr lang="en-US" smtClean="0"/>
-              <a:t>7/18/24</a:t>
+              <a:t>7/19/24</a:t>
             </a:fld>
             <a:endParaRPr lang="en-US"/>
           </a:p>
@@ -3366,7 +3414,7 @@
           <a:p>
             <a:fld id="{803F9780-EB5E-084D-9DB8-7D85A386B454}" type="datetimeFigureOut">
               <a:rPr lang="en-US" smtClean="0"/>
-              <a:t>7/18/24</a:t>
+              <a:t>7/19/24</a:t>
             </a:fld>
             <a:endParaRPr lang="en-US"/>
           </a:p>
@@ -3817,6 +3865,156 @@
     <p:extLst>
       <p:ext uri="{BB962C8B-B14F-4D97-AF65-F5344CB8AC3E}">
         <p14:creationId xmlns:p14="http://schemas.microsoft.com/office/powerpoint/2010/main" val="3943109491"/>
+      </p:ext>
+    </p:extLst>
+  </p:cSld>
+  <p:clrMapOvr>
+    <a:masterClrMapping/>
+  </p:clrMapOvr>
+</p:sld>
+</file>
+
+<file path=ppt/slides/slide2.xml><?xml version="1.0" encoding="utf-8"?>
+<p:sld xmlns:a="http://schemas.openxmlformats.org/drawingml/2006/main" xmlns:r="http://schemas.openxmlformats.org/officeDocument/2006/relationships" xmlns:p="http://schemas.openxmlformats.org/presentationml/2006/main">
+  <p:cSld>
+    <p:spTree>
+      <p:nvGrpSpPr>
+        <p:cNvPr id="1" name=""/>
+        <p:cNvGrpSpPr/>
+        <p:nvPr/>
+      </p:nvGrpSpPr>
+      <p:grpSpPr>
+        <a:xfrm>
+          <a:off x="0" y="0"/>
+          <a:ext cx="0" cy="0"/>
+          <a:chOff x="0" y="0"/>
+          <a:chExt cx="0" cy="0"/>
+        </a:xfrm>
+      </p:grpSpPr>
+      <p:pic>
+        <p:nvPicPr>
+          <p:cNvPr id="5" name="Picture 4" descr="A screenshot of a cell phone&#10;&#10;Description automatically generated">
+            <a:extLst>
+              <a:ext uri="{FF2B5EF4-FFF2-40B4-BE49-F238E27FC236}">
+                <a16:creationId xmlns:a16="http://schemas.microsoft.com/office/drawing/2014/main" id="{5D1B1788-4A99-95B0-9475-6F5CECEB33B4}"/>
+              </a:ext>
+            </a:extLst>
+          </p:cNvPr>
+          <p:cNvPicPr>
+            <a:picLocks noChangeAspect="1"/>
+          </p:cNvPicPr>
+          <p:nvPr/>
+        </p:nvPicPr>
+        <p:blipFill>
+          <a:blip r:embed="rId2"/>
+          <a:stretch>
+            <a:fillRect/>
+          </a:stretch>
+        </p:blipFill>
+        <p:spPr>
+          <a:xfrm>
+            <a:off x="2147957" y="1659835"/>
+            <a:ext cx="6985000" cy="1066800"/>
+          </a:xfrm>
+          <a:prstGeom prst="rect">
+            <a:avLst/>
+          </a:prstGeom>
+        </p:spPr>
+      </p:pic>
+      <p:pic>
+        <p:nvPicPr>
+          <p:cNvPr id="7" name="Picture 6" descr="A screenshot of a cell phone&#10;&#10;Description automatically generated">
+            <a:extLst>
+              <a:ext uri="{FF2B5EF4-FFF2-40B4-BE49-F238E27FC236}">
+                <a16:creationId xmlns:a16="http://schemas.microsoft.com/office/drawing/2014/main" id="{CBF0DB09-35A5-F93E-FEBD-DBAEE198E699}"/>
+              </a:ext>
+            </a:extLst>
+          </p:cNvPr>
+          <p:cNvPicPr>
+            <a:picLocks noChangeAspect="1"/>
+          </p:cNvPicPr>
+          <p:nvPr/>
+        </p:nvPicPr>
+        <p:blipFill>
+          <a:blip r:embed="rId3"/>
+          <a:stretch>
+            <a:fillRect/>
+          </a:stretch>
+        </p:blipFill>
+        <p:spPr>
+          <a:xfrm>
+            <a:off x="2147957" y="3067878"/>
+            <a:ext cx="6934200" cy="1066800"/>
+          </a:xfrm>
+          <a:prstGeom prst="rect">
+            <a:avLst/>
+          </a:prstGeom>
+        </p:spPr>
+      </p:pic>
+    </p:spTree>
+    <p:extLst>
+      <p:ext uri="{BB962C8B-B14F-4D97-AF65-F5344CB8AC3E}">
+        <p14:creationId xmlns:p14="http://schemas.microsoft.com/office/powerpoint/2010/main" val="312332336"/>
+      </p:ext>
+    </p:extLst>
+  </p:cSld>
+  <p:clrMapOvr>
+    <a:masterClrMapping/>
+  </p:clrMapOvr>
+</p:sld>
+</file>
+
+<file path=ppt/slides/slide3.xml><?xml version="1.0" encoding="utf-8"?>
+<p:sld xmlns:a="http://schemas.openxmlformats.org/drawingml/2006/main" xmlns:r="http://schemas.openxmlformats.org/officeDocument/2006/relationships" xmlns:p="http://schemas.openxmlformats.org/presentationml/2006/main">
+  <p:cSld>
+    <p:spTree>
+      <p:nvGrpSpPr>
+        <p:cNvPr id="1" name=""/>
+        <p:cNvGrpSpPr/>
+        <p:nvPr/>
+      </p:nvGrpSpPr>
+      <p:grpSpPr>
+        <a:xfrm>
+          <a:off x="0" y="0"/>
+          <a:ext cx="0" cy="0"/>
+          <a:chOff x="0" y="0"/>
+          <a:chExt cx="0" cy="0"/>
+        </a:xfrm>
+      </p:grpSpPr>
+      <p:pic>
+        <p:nvPicPr>
+          <p:cNvPr id="5" name="Picture 4" descr="A graph of a number of people&#10;&#10;Description automatically generated with medium confidence">
+            <a:extLst>
+              <a:ext uri="{FF2B5EF4-FFF2-40B4-BE49-F238E27FC236}">
+                <a16:creationId xmlns:a16="http://schemas.microsoft.com/office/drawing/2014/main" id="{002CD7E0-9234-9908-AAB2-2B7381C749A5}"/>
+              </a:ext>
+            </a:extLst>
+          </p:cNvPr>
+          <p:cNvPicPr>
+            <a:picLocks noChangeAspect="1"/>
+          </p:cNvPicPr>
+          <p:nvPr/>
+        </p:nvPicPr>
+        <p:blipFill>
+          <a:blip r:embed="rId2"/>
+          <a:stretch>
+            <a:fillRect/>
+          </a:stretch>
+        </p:blipFill>
+        <p:spPr>
+          <a:xfrm>
+            <a:off x="1109396" y="86915"/>
+            <a:ext cx="9973208" cy="6684170"/>
+          </a:xfrm>
+          <a:prstGeom prst="rect">
+            <a:avLst/>
+          </a:prstGeom>
+        </p:spPr>
+      </p:pic>
+    </p:spTree>
+    <p:extLst>
+      <p:ext uri="{BB962C8B-B14F-4D97-AF65-F5344CB8AC3E}">
+        <p14:creationId xmlns:p14="http://schemas.microsoft.com/office/powerpoint/2010/main" val="597398599"/>
       </p:ext>
     </p:extLst>
   </p:cSld>

</xml_diff>